<commit_message>
Updated session 8 slides.
</commit_message>
<xml_diff>
--- a/slides/session08.pptx
+++ b/slides/session08.pptx
@@ -2165,25 +2165,8 @@
                 <a:latin typeface="Gill Sans"/>
                 <a:cs typeface="Gill Sans"/>
               </a:rPr>
-              <a:t>Thursday, October </a:t>
-            </a:r>
-            <a:r>
-              <a:rPr lang="en-US" sz="2400" b="0" kern="0" dirty="0" smtClean="0">
-                <a:solidFill>
-                  <a:schemeClr val="bg1"/>
-                </a:solidFill>
-                <a:latin typeface="Gill Sans"/>
-                <a:cs typeface="Gill Sans"/>
-              </a:rPr>
-              <a:t>24, 2013</a:t>
-            </a:r>
-            <a:endParaRPr lang="en-US" sz="2400" b="0" kern="0" dirty="0" smtClean="0">
-              <a:solidFill>
-                <a:schemeClr val="bg1"/>
-              </a:solidFill>
-              <a:latin typeface="Gill Sans"/>
-              <a:cs typeface="Gill Sans"/>
-            </a:endParaRPr>
+              <a:t>Thursday, October 24, 2013</a:t>
+            </a:r>
           </a:p>
         </p:txBody>
       </p:sp>
@@ -4058,7 +4041,7 @@
         <p:spPr>
           <a:xfrm>
             <a:off x="1219200" y="1657290"/>
-            <a:ext cx="5686172" cy="400110"/>
+            <a:ext cx="7363364" cy="400110"/>
           </a:xfrm>
           <a:prstGeom prst="rect">
             <a:avLst/>
@@ -4089,7 +4072,7 @@
                 <a:latin typeface="Gill Sans"/>
                 <a:cs typeface="Gill Sans"/>
               </a:rPr>
-              <a:t>search.twitter.com</a:t>
+              <a:t>download.finance.yahoo.com</a:t>
             </a:r>
             <a:r>
               <a:rPr lang="en-US" sz="2000" b="0" dirty="0">
@@ -4099,7 +4082,7 @@
                 <a:latin typeface="Gill Sans"/>
                 <a:cs typeface="Gill Sans"/>
               </a:rPr>
-              <a:t>/</a:t>
+              <a:t>/d/</a:t>
             </a:r>
             <a:r>
               <a:rPr lang="en-US" sz="2000" b="0" dirty="0" err="1">
@@ -4109,7 +4092,7 @@
                 <a:latin typeface="Gill Sans"/>
                 <a:cs typeface="Gill Sans"/>
               </a:rPr>
-              <a:t>search.json?q</a:t>
+              <a:t>quotes.csv?s</a:t>
             </a:r>
             <a:r>
               <a:rPr lang="en-US" sz="2000" b="0" dirty="0">
@@ -4129,7 +4112,17 @@
                 <a:latin typeface="Gill Sans"/>
                 <a:cs typeface="Gill Sans"/>
               </a:rPr>
-              <a:t>justin+bieber</a:t>
+              <a:t>GOOG&amp;f</a:t>
+            </a:r>
+            <a:r>
+              <a:rPr lang="en-US" sz="2000" b="0" dirty="0">
+                <a:solidFill>
+                  <a:schemeClr val="bg1"/>
+                </a:solidFill>
+                <a:latin typeface="Gill Sans"/>
+                <a:cs typeface="Gill Sans"/>
+              </a:rPr>
+              <a:t>=nsl1op</a:t>
             </a:r>
             <a:endParaRPr lang="en-US" sz="2000" b="0" dirty="0">
               <a:solidFill>
@@ -5288,7 +5281,7 @@
           <a:p>
             <a:r>
               <a:rPr lang="en-US" dirty="0" smtClean="0"/>
-              <a:t>Ride: Ride ID, Driver ID, Origin, Destination, Available Seats</a:t>
+              <a:t>Ride: Ride ID, Driver ID, Origin, Destination, Date, Time, Available Seats</a:t>
             </a:r>
           </a:p>
           <a:p>

</xml_diff>